<commit_message>
Change coloring of diagram
</commit_message>
<xml_diff>
--- a/docs/slides/Find.pptx
+++ b/docs/slides/Find.pptx
@@ -3971,6 +3971,104 @@
       </p:grpSpPr>
       <p:sp>
         <p:nvSpPr>
+          <p:cNvPr id="39" name="Rectangle 38">
+            <a:extLst>
+              <a:ext uri="{FF2B5EF4-FFF2-40B4-BE49-F238E27FC236}">
+                <a16:creationId xmlns:a16="http://schemas.microsoft.com/office/drawing/2014/main" id="{069FB1D7-E062-43EA-B914-35B271702825}"/>
+              </a:ext>
+            </a:extLst>
+          </p:cNvPr>
+          <p:cNvSpPr/>
+          <p:nvPr/>
+        </p:nvSpPr>
+        <p:spPr>
+          <a:xfrm>
+            <a:off x="5749091" y="4473923"/>
+            <a:ext cx="2671264" cy="571011"/>
+          </a:xfrm>
+          <a:prstGeom prst="rect">
+            <a:avLst/>
+          </a:prstGeom>
+          <a:gradFill rotWithShape="1">
+            <a:gsLst>
+              <a:gs pos="0">
+                <a:srgbClr val="4F81BD">
+                  <a:tint val="50000"/>
+                  <a:satMod val="300000"/>
+                </a:srgbClr>
+              </a:gs>
+              <a:gs pos="35000">
+                <a:srgbClr val="4F81BD">
+                  <a:tint val="37000"/>
+                  <a:satMod val="300000"/>
+                </a:srgbClr>
+              </a:gs>
+              <a:gs pos="100000">
+                <a:srgbClr val="4F81BD">
+                  <a:tint val="15000"/>
+                  <a:satMod val="350000"/>
+                </a:srgbClr>
+              </a:gs>
+            </a:gsLst>
+            <a:lin ang="16200000" scaled="1"/>
+          </a:gradFill>
+          <a:ln w="9525" cap="flat" cmpd="sng" algn="ctr">
+            <a:solidFill>
+              <a:srgbClr val="4F81BD">
+                <a:shade val="95000"/>
+                <a:satMod val="105000"/>
+              </a:srgbClr>
+            </a:solidFill>
+            <a:prstDash val="solid"/>
+          </a:ln>
+          <a:effectLst>
+            <a:outerShdw blurRad="40000" dist="20000" dir="5400000" rotWithShape="0">
+              <a:srgbClr val="000000">
+                <a:alpha val="38000"/>
+              </a:srgbClr>
+            </a:outerShdw>
+          </a:effectLst>
+        </p:spPr>
+        <p:txBody>
+          <a:bodyPr rtlCol="0" anchor="ctr"/>
+          <a:lstStyle/>
+          <a:p>
+            <a:pPr marL="0" marR="0" lvl="0" indent="0" algn="ctr" defTabSz="914400" eaLnBrk="1" fontAlgn="auto" latinLnBrk="0" hangingPunct="1">
+              <a:lnSpc>
+                <a:spcPct val="100000"/>
+              </a:lnSpc>
+              <a:spcBef>
+                <a:spcPts val="0"/>
+              </a:spcBef>
+              <a:spcAft>
+                <a:spcPts val="0"/>
+              </a:spcAft>
+              <a:buClrTx/>
+              <a:buSzTx/>
+              <a:buFontTx/>
+              <a:buNone/>
+              <a:tabLst/>
+              <a:defRPr/>
+            </a:pPr>
+            <a:endParaRPr kumimoji="0" lang="en-SG" sz="1800" b="0" i="0" u="none" strike="noStrike" kern="0" cap="none" spc="0" normalizeH="0" baseline="0" noProof="0" dirty="0">
+              <a:ln>
+                <a:noFill/>
+              </a:ln>
+              <a:solidFill>
+                <a:prstClr val="black"/>
+              </a:solidFill>
+              <a:effectLst/>
+              <a:uLnTx/>
+              <a:uFillTx/>
+              <a:latin typeface="Calibri"/>
+              <a:ea typeface="+mn-ea"/>
+              <a:cs typeface="+mn-cs"/>
+            </a:endParaRPr>
+          </a:p>
+        </p:txBody>
+      </p:sp>
+      <p:sp>
+        <p:nvSpPr>
           <p:cNvPr id="5" name="Line 13"/>
           <p:cNvSpPr>
             <a:spLocks noChangeShapeType="1"/>
@@ -5233,187 +5331,12 @@
         </p:nvGrpSpPr>
         <p:grpSpPr>
           <a:xfrm>
-            <a:off x="5749090" y="4476862"/>
-            <a:ext cx="3193076" cy="651617"/>
-            <a:chOff x="5749090" y="4476862"/>
-            <a:chExt cx="3193076" cy="651617"/>
+            <a:off x="5749090" y="4477790"/>
+            <a:ext cx="3193076" cy="406532"/>
+            <a:chOff x="5749090" y="4477790"/>
+            <a:chExt cx="3193076" cy="406532"/>
           </a:xfrm>
         </p:grpSpPr>
-        <p:sp>
-          <p:nvSpPr>
-            <p:cNvPr id="32" name="Rectangle 31">
-              <a:extLst>
-                <a:ext uri="{FF2B5EF4-FFF2-40B4-BE49-F238E27FC236}">
-                  <a16:creationId xmlns:a16="http://schemas.microsoft.com/office/drawing/2014/main" id="{E7BAA58F-A872-4FEF-AD11-8205C35F6FBC}"/>
-                </a:ext>
-              </a:extLst>
-            </p:cNvPr>
-            <p:cNvSpPr>
-              <a:spLocks noChangeArrowheads="1"/>
-            </p:cNvSpPr>
-            <p:nvPr/>
-          </p:nvSpPr>
-          <p:spPr bwMode="auto">
-            <a:xfrm>
-              <a:off x="5749090" y="4476862"/>
-              <a:ext cx="2804646" cy="651617"/>
-            </a:xfrm>
-            <a:prstGeom prst="rect">
-              <a:avLst/>
-            </a:prstGeom>
-            <a:solidFill>
-              <a:srgbClr val="00CCFF"/>
-            </a:solidFill>
-            <a:ln w="19050" algn="ctr">
-              <a:solidFill>
-                <a:srgbClr val="0070C0"/>
-              </a:solidFill>
-              <a:miter lim="800000"/>
-              <a:headEnd/>
-              <a:tailEnd/>
-            </a:ln>
-          </p:spPr>
-          <p:txBody>
-            <a:bodyPr wrap="none" anchor="ctr"/>
-            <a:lstStyle>
-              <a:defPPr>
-                <a:defRPr lang="en-SG"/>
-              </a:defPPr>
-              <a:lvl1pPr algn="l" rtl="0" fontAlgn="base">
-                <a:spcBef>
-                  <a:spcPct val="0"/>
-                </a:spcBef>
-                <a:spcAft>
-                  <a:spcPct val="0"/>
-                </a:spcAft>
-                <a:defRPr kern="1200">
-                  <a:solidFill>
-                    <a:schemeClr val="tx1"/>
-                  </a:solidFill>
-                  <a:latin typeface="Arial" charset="0"/>
-                  <a:ea typeface="+mn-ea"/>
-                  <a:cs typeface="Arial" charset="0"/>
-                </a:defRPr>
-              </a:lvl1pPr>
-              <a:lvl2pPr marL="457200" algn="l" rtl="0" fontAlgn="base">
-                <a:spcBef>
-                  <a:spcPct val="0"/>
-                </a:spcBef>
-                <a:spcAft>
-                  <a:spcPct val="0"/>
-                </a:spcAft>
-                <a:defRPr kern="1200">
-                  <a:solidFill>
-                    <a:schemeClr val="tx1"/>
-                  </a:solidFill>
-                  <a:latin typeface="Arial" charset="0"/>
-                  <a:ea typeface="+mn-ea"/>
-                  <a:cs typeface="Arial" charset="0"/>
-                </a:defRPr>
-              </a:lvl2pPr>
-              <a:lvl3pPr marL="914400" algn="l" rtl="0" fontAlgn="base">
-                <a:spcBef>
-                  <a:spcPct val="0"/>
-                </a:spcBef>
-                <a:spcAft>
-                  <a:spcPct val="0"/>
-                </a:spcAft>
-                <a:defRPr kern="1200">
-                  <a:solidFill>
-                    <a:schemeClr val="tx1"/>
-                  </a:solidFill>
-                  <a:latin typeface="Arial" charset="0"/>
-                  <a:ea typeface="+mn-ea"/>
-                  <a:cs typeface="Arial" charset="0"/>
-                </a:defRPr>
-              </a:lvl3pPr>
-              <a:lvl4pPr marL="1371600" algn="l" rtl="0" fontAlgn="base">
-                <a:spcBef>
-                  <a:spcPct val="0"/>
-                </a:spcBef>
-                <a:spcAft>
-                  <a:spcPct val="0"/>
-                </a:spcAft>
-                <a:defRPr kern="1200">
-                  <a:solidFill>
-                    <a:schemeClr val="tx1"/>
-                  </a:solidFill>
-                  <a:latin typeface="Arial" charset="0"/>
-                  <a:ea typeface="+mn-ea"/>
-                  <a:cs typeface="Arial" charset="0"/>
-                </a:defRPr>
-              </a:lvl4pPr>
-              <a:lvl5pPr marL="1828800" algn="l" rtl="0" fontAlgn="base">
-                <a:spcBef>
-                  <a:spcPct val="0"/>
-                </a:spcBef>
-                <a:spcAft>
-                  <a:spcPct val="0"/>
-                </a:spcAft>
-                <a:defRPr kern="1200">
-                  <a:solidFill>
-                    <a:schemeClr val="tx1"/>
-                  </a:solidFill>
-                  <a:latin typeface="Arial" charset="0"/>
-                  <a:ea typeface="+mn-ea"/>
-                  <a:cs typeface="Arial" charset="0"/>
-                </a:defRPr>
-              </a:lvl5pPr>
-              <a:lvl6pPr marL="2286000" algn="l" defTabSz="914400" rtl="0" eaLnBrk="1" latinLnBrk="0" hangingPunct="1">
-                <a:defRPr kern="1200">
-                  <a:solidFill>
-                    <a:schemeClr val="tx1"/>
-                  </a:solidFill>
-                  <a:latin typeface="Arial" charset="0"/>
-                  <a:ea typeface="+mn-ea"/>
-                  <a:cs typeface="Arial" charset="0"/>
-                </a:defRPr>
-              </a:lvl6pPr>
-              <a:lvl7pPr marL="2743200" algn="l" defTabSz="914400" rtl="0" eaLnBrk="1" latinLnBrk="0" hangingPunct="1">
-                <a:defRPr kern="1200">
-                  <a:solidFill>
-                    <a:schemeClr val="tx1"/>
-                  </a:solidFill>
-                  <a:latin typeface="Arial" charset="0"/>
-                  <a:ea typeface="+mn-ea"/>
-                  <a:cs typeface="Arial" charset="0"/>
-                </a:defRPr>
-              </a:lvl7pPr>
-              <a:lvl8pPr marL="3200400" algn="l" defTabSz="914400" rtl="0" eaLnBrk="1" latinLnBrk="0" hangingPunct="1">
-                <a:defRPr kern="1200">
-                  <a:solidFill>
-                    <a:schemeClr val="tx1"/>
-                  </a:solidFill>
-                  <a:latin typeface="Arial" charset="0"/>
-                  <a:ea typeface="+mn-ea"/>
-                  <a:cs typeface="Arial" charset="0"/>
-                </a:defRPr>
-              </a:lvl8pPr>
-              <a:lvl9pPr marL="3657600" algn="l" defTabSz="914400" rtl="0" eaLnBrk="1" latinLnBrk="0" hangingPunct="1">
-                <a:defRPr kern="1200">
-                  <a:solidFill>
-                    <a:schemeClr val="tx1"/>
-                  </a:solidFill>
-                  <a:latin typeface="Arial" charset="0"/>
-                  <a:ea typeface="+mn-ea"/>
-                  <a:cs typeface="Arial" charset="0"/>
-                </a:defRPr>
-              </a:lvl9pPr>
-            </a:lstStyle>
-            <a:p>
-              <a:pPr defTabSz="872733"/>
-              <a:r>
-                <a:rPr lang="en-US" sz="2000" dirty="0">
-                  <a:solidFill>
-                    <a:prstClr val="black"/>
-                  </a:solidFill>
-                  <a:latin typeface="Calibri" pitchFamily="34" charset="0"/>
-                </a:rPr>
-                <a:t>					</a:t>
-              </a:r>
-            </a:p>
-          </p:txBody>
-        </p:sp>
         <p:sp>
           <p:nvSpPr>
             <p:cNvPr id="35" name="Snip Single Corner Rectangle 63">

</xml_diff>

<commit_message>
Change diagram again and again
</commit_message>
<xml_diff>
--- a/docs/slides/Find.pptx
+++ b/docs/slides/Find.pptx
@@ -3983,7 +3983,7 @@
         </p:nvSpPr>
         <p:spPr>
           <a:xfrm>
-            <a:off x="5749092" y="4455359"/>
+            <a:off x="5885873" y="4435262"/>
             <a:ext cx="2480509" cy="528528"/>
           </a:xfrm>
           <a:prstGeom prst="rect">
@@ -5053,7 +5053,7 @@
           <a:p>
             <a:pPr algn="ctr"/>
             <a:r>
-              <a:rPr lang="en-SG" sz="1300" dirty="0">
+              <a:rPr lang="en-SG" sz="1500" dirty="0">
                 <a:latin typeface="Calibri"/>
                 <a:ea typeface="Calibri"/>
                 <a:cs typeface="Calibri"/>
@@ -5061,7 +5061,7 @@
               </a:rPr>
               <a:t>:Duke</a:t>
             </a:r>
-            <a:endParaRPr sz="1300" dirty="0"/>
+            <a:endParaRPr sz="1500" dirty="0"/>
           </a:p>
         </p:txBody>
       </p:sp>
@@ -5134,7 +5134,7 @@
           <a:p>
             <a:pPr algn="ctr"/>
             <a:r>
-              <a:rPr lang="en" sz="1300" dirty="0">
+              <a:rPr lang="en" sz="1500" dirty="0">
                 <a:latin typeface="Calibri"/>
                 <a:ea typeface="Calibri"/>
                 <a:cs typeface="Calibri"/>
@@ -5142,7 +5142,7 @@
               </a:rPr>
               <a:t>:Parser</a:t>
             </a:r>
-            <a:endParaRPr sz="1300" dirty="0"/>
+            <a:endParaRPr sz="1500" dirty="0"/>
           </a:p>
         </p:txBody>
       </p:sp>
@@ -5161,9 +5161,9 @@
         <p:grpSpPr>
           <a:xfrm>
             <a:off x="7315200" y="3140072"/>
-            <a:ext cx="1577356" cy="3192315"/>
+            <a:ext cx="1678526" cy="3212040"/>
             <a:chOff x="7440922" y="3140072"/>
-            <a:chExt cx="1577356" cy="3192315"/>
+            <a:chExt cx="1678526" cy="3212040"/>
           </a:xfrm>
         </p:grpSpPr>
         <p:sp>
@@ -5182,7 +5182,7 @@
           </p:nvSpPr>
           <p:spPr bwMode="auto">
             <a:xfrm>
-              <a:off x="8229600" y="3740236"/>
+              <a:off x="8279122" y="3759961"/>
               <a:ext cx="0" cy="2592151"/>
             </a:xfrm>
             <a:prstGeom prst="line">
@@ -5241,7 +5241,7 @@
           <p:spPr>
             <a:xfrm>
               <a:off x="7440922" y="3140072"/>
-              <a:ext cx="1577356" cy="600164"/>
+              <a:ext cx="1678526" cy="600164"/>
             </a:xfrm>
             <a:prstGeom prst="rect">
               <a:avLst/>
@@ -5301,14 +5301,14 @@
                 <a:buNone/>
               </a:pPr>
               <a:r>
-                <a:rPr lang="en-US" sz="1400" dirty="0" err="1">
+                <a:rPr lang="en-US" sz="1500" dirty="0" err="1">
                   <a:solidFill>
                     <a:prstClr val="black"/>
                   </a:solidFill>
                 </a:rPr>
                 <a:t>items:ShoppingList</a:t>
               </a:r>
-              <a:endParaRPr lang="en-US" sz="1400" dirty="0">
+              <a:endParaRPr lang="en-US" sz="1500" dirty="0">
                 <a:solidFill>
                   <a:prstClr val="black"/>
                 </a:solidFill>
@@ -5331,10 +5331,10 @@
         </p:nvGrpSpPr>
         <p:grpSpPr>
           <a:xfrm>
-            <a:off x="5749092" y="4390140"/>
-            <a:ext cx="3311384" cy="381000"/>
-            <a:chOff x="5749091" y="4412571"/>
-            <a:chExt cx="3311384" cy="381000"/>
+            <a:off x="5885873" y="4362498"/>
+            <a:ext cx="3258127" cy="381000"/>
+            <a:chOff x="5885872" y="4384929"/>
+            <a:chExt cx="3258127" cy="381000"/>
           </a:xfrm>
         </p:grpSpPr>
         <p:sp>
@@ -5351,7 +5351,7 @@
           </p:nvSpPr>
           <p:spPr>
             <a:xfrm flipV="1">
-              <a:off x="5749091" y="4477790"/>
+              <a:off x="5885872" y="4462733"/>
               <a:ext cx="575508" cy="243970"/>
             </a:xfrm>
             <a:prstGeom prst="snip1Rect">
@@ -5411,7 +5411,7 @@
           </p:nvSpPr>
           <p:spPr bwMode="auto">
             <a:xfrm>
-              <a:off x="5867399" y="4412571"/>
+              <a:off x="5950923" y="4384929"/>
               <a:ext cx="3193076" cy="381000"/>
             </a:xfrm>
             <a:prstGeom prst="rect">
@@ -5594,7 +5594,7 @@
         </p:nvSpPr>
         <p:spPr bwMode="auto">
           <a:xfrm>
-            <a:off x="6494246" y="4577344"/>
+            <a:off x="6587364" y="4486465"/>
             <a:ext cx="958147" cy="381000"/>
           </a:xfrm>
           <a:prstGeom prst="rect">

</xml_diff>